<commit_message>
update item05、item06 slide and project
</commit_message>
<xml_diff>
--- a/more-effective-csharp-2nd-edition/slides/item05-確保0是實值型別的有效狀態.pptx
+++ b/more-effective-csharp-2nd-edition/slides/item05-確保0是實值型別的有效狀態.pptx
@@ -195,7 +195,7 @@
           <a:p>
             <a:fld id="{7287596F-5AEE-4A09-B007-52FE8F05C9A1}" type="datetimeFigureOut">
               <a:rPr lang="zh-TW" altLang="en-US" smtClean="0"/>
-              <a:t>2020/3/16</a:t>
+              <a:t>2020/3/17</a:t>
             </a:fld>
             <a:endParaRPr lang="zh-TW" altLang="en-US"/>
           </a:p>
@@ -473,7 +473,7 @@
           <a:p>
             <a:fld id="{BC026C39-E73D-4404-99C8-E3E59EB363C5}" type="datetimeFigureOut">
               <a:rPr lang="zh-TW" altLang="en-US" smtClean="0"/>
-              <a:t>2020/3/16</a:t>
+              <a:t>2020/3/17</a:t>
             </a:fld>
             <a:endParaRPr lang="zh-TW" altLang="en-US"/>
           </a:p>
@@ -657,7 +657,7 @@
           <a:p>
             <a:fld id="{BC026C39-E73D-4404-99C8-E3E59EB363C5}" type="datetimeFigureOut">
               <a:rPr lang="zh-TW" altLang="en-US" smtClean="0"/>
-              <a:t>2020/3/16</a:t>
+              <a:t>2020/3/17</a:t>
             </a:fld>
             <a:endParaRPr lang="zh-TW" altLang="en-US"/>
           </a:p>
@@ -851,7 +851,7 @@
           <a:p>
             <a:fld id="{BC026C39-E73D-4404-99C8-E3E59EB363C5}" type="datetimeFigureOut">
               <a:rPr lang="zh-TW" altLang="en-US" smtClean="0"/>
-              <a:t>2020/3/16</a:t>
+              <a:t>2020/3/17</a:t>
             </a:fld>
             <a:endParaRPr lang="zh-TW" altLang="en-US"/>
           </a:p>
@@ -1035,7 +1035,7 @@
           <a:p>
             <a:fld id="{BC026C39-E73D-4404-99C8-E3E59EB363C5}" type="datetimeFigureOut">
               <a:rPr lang="zh-TW" altLang="en-US" smtClean="0"/>
-              <a:t>2020/3/16</a:t>
+              <a:t>2020/3/17</a:t>
             </a:fld>
             <a:endParaRPr lang="zh-TW" altLang="en-US"/>
           </a:p>
@@ -1295,7 +1295,7 @@
           <a:p>
             <a:fld id="{BC026C39-E73D-4404-99C8-E3E59EB363C5}" type="datetimeFigureOut">
               <a:rPr lang="zh-TW" altLang="en-US" smtClean="0"/>
-              <a:t>2020/3/16</a:t>
+              <a:t>2020/3/17</a:t>
             </a:fld>
             <a:endParaRPr lang="zh-TW" altLang="en-US"/>
           </a:p>
@@ -1583,7 +1583,7 @@
           <a:p>
             <a:fld id="{BC026C39-E73D-4404-99C8-E3E59EB363C5}" type="datetimeFigureOut">
               <a:rPr lang="zh-TW" altLang="en-US" smtClean="0"/>
-              <a:t>2020/3/16</a:t>
+              <a:t>2020/3/17</a:t>
             </a:fld>
             <a:endParaRPr lang="zh-TW" altLang="en-US"/>
           </a:p>
@@ -2019,7 +2019,7 @@
           <a:p>
             <a:fld id="{BC026C39-E73D-4404-99C8-E3E59EB363C5}" type="datetimeFigureOut">
               <a:rPr lang="zh-TW" altLang="en-US" smtClean="0"/>
-              <a:t>2020/3/16</a:t>
+              <a:t>2020/3/17</a:t>
             </a:fld>
             <a:endParaRPr lang="zh-TW" altLang="en-US"/>
           </a:p>
@@ -2151,7 +2151,7 @@
           <a:p>
             <a:fld id="{BC026C39-E73D-4404-99C8-E3E59EB363C5}" type="datetimeFigureOut">
               <a:rPr lang="zh-TW" altLang="en-US" smtClean="0"/>
-              <a:t>2020/3/16</a:t>
+              <a:t>2020/3/17</a:t>
             </a:fld>
             <a:endParaRPr lang="zh-TW" altLang="en-US"/>
           </a:p>
@@ -2260,7 +2260,7 @@
           <a:p>
             <a:fld id="{BC026C39-E73D-4404-99C8-E3E59EB363C5}" type="datetimeFigureOut">
               <a:rPr lang="zh-TW" altLang="en-US" smtClean="0"/>
-              <a:t>2020/3/16</a:t>
+              <a:t>2020/3/17</a:t>
             </a:fld>
             <a:endParaRPr lang="zh-TW" altLang="en-US"/>
           </a:p>
@@ -2551,7 +2551,7 @@
           <a:p>
             <a:fld id="{BC026C39-E73D-4404-99C8-E3E59EB363C5}" type="datetimeFigureOut">
               <a:rPr lang="zh-TW" altLang="en-US" smtClean="0"/>
-              <a:t>2020/3/16</a:t>
+              <a:t>2020/3/17</a:t>
             </a:fld>
             <a:endParaRPr lang="zh-TW" altLang="en-US"/>
           </a:p>
@@ -2818,7 +2818,7 @@
           <a:p>
             <a:fld id="{BC026C39-E73D-4404-99C8-E3E59EB363C5}" type="datetimeFigureOut">
               <a:rPr lang="zh-TW" altLang="en-US" smtClean="0"/>
-              <a:t>2020/3/16</a:t>
+              <a:t>2020/3/17</a:t>
             </a:fld>
             <a:endParaRPr lang="zh-TW" altLang="en-US"/>
           </a:p>
@@ -3038,7 +3038,7 @@
           <a:p>
             <a:fld id="{BC026C39-E73D-4404-99C8-E3E59EB363C5}" type="datetimeFigureOut">
               <a:rPr lang="zh-TW" altLang="en-US" smtClean="0"/>
-              <a:t>2020/3/16</a:t>
+              <a:t>2020/3/17</a:t>
             </a:fld>
             <a:endParaRPr lang="zh-TW" altLang="en-US"/>
           </a:p>
@@ -3469,7 +3469,6 @@
               <a:rPr lang="zh-TW" altLang="en-US" dirty="0"/>
               <a:t>是實值型別的有效狀態</a:t>
             </a:r>
-            <a:endParaRPr lang="zh-TW" altLang="en-US" dirty="0"/>
           </a:p>
         </p:txBody>
       </p:sp>
@@ -3548,7 +3547,6 @@
               <a:rPr lang="zh-TW" altLang="en-US" dirty="0"/>
               <a:t>別的有效狀態</a:t>
             </a:r>
-            <a:endParaRPr lang="zh-TW" altLang="en-US" dirty="0"/>
           </a:p>
         </p:txBody>
       </p:sp>
@@ -3845,7 +3843,26 @@
             </a:r>
             <a:r>
               <a:rPr lang="zh-TW" altLang="en-US" dirty="0" smtClean="0"/>
-              <a:t>值。</a:t>
+              <a:t>值</a:t>
+            </a:r>
+            <a:r>
+              <a:rPr lang="zh-TW" altLang="en-US" dirty="0" smtClean="0"/>
+              <a:t>。</a:t>
+            </a:r>
+            <a:endParaRPr lang="en-US" altLang="zh-TW" dirty="0" smtClean="0"/>
+          </a:p>
+          <a:p>
+            <a:r>
+              <a:rPr lang="zh-TW" altLang="en-US" dirty="0"/>
+              <a:t>如果可能，把全為</a:t>
+            </a:r>
+            <a:r>
+              <a:rPr lang="en-US" altLang="zh-TW" dirty="0" smtClean="0"/>
+              <a:t>0</a:t>
+            </a:r>
+            <a:r>
+              <a:rPr lang="zh-TW" altLang="en-US" smtClean="0"/>
+              <a:t>的情況作為自然的預設值。</a:t>
             </a:r>
             <a:endParaRPr lang="zh-TW" altLang="en-US" dirty="0" smtClean="0"/>
           </a:p>

</xml_diff>